<commit_message>
NOJIRA updated with new 3part schema diagram
</commit_message>
<xml_diff>
--- a/docs/allteam-061409-toronto/Toronto_BehindTheScenes.pptx
+++ b/docs/allteam-061409-toronto/Toronto_BehindTheScenes.pptx
@@ -7577,13 +7577,8 @@
             <a:pPr lvl="1"/>
             <a:r>
               <a:rPr lang="en-US" sz="2000" dirty="0" smtClean="0"/>
-              <a:t>Audit </a:t>
-            </a:r>
-            <a:r>
-              <a:rPr lang="en-US" sz="2000" dirty="0" smtClean="0"/>
-              <a:t>trail</a:t>
-            </a:r>
-            <a:endParaRPr lang="en-US" sz="2000" dirty="0" smtClean="0"/>
+              <a:t>Audit trail</a:t>
+            </a:r>
           </a:p>
         </p:txBody>
       </p:sp>
@@ -7723,33 +7718,21 @@
             <a:pPr lvl="1"/>
             <a:r>
               <a:rPr lang="en-US" sz="2000" dirty="0" smtClean="0"/>
-              <a:t>Nuxeo </a:t>
-            </a:r>
+              <a:t>Nuxeo repository</a:t>
+            </a:r>
+          </a:p>
+          <a:p>
+            <a:pPr lvl="2"/>
+            <a:r>
+              <a:rPr lang="en-US" sz="1600" dirty="0" smtClean="0"/>
+              <a:t>Domain per tenant, repository per tenant, hybrid</a:t>
+            </a:r>
+          </a:p>
+          <a:p>
+            <a:pPr lvl="1"/>
             <a:r>
               <a:rPr lang="en-US" sz="2000" dirty="0" smtClean="0"/>
-              <a:t>repository</a:t>
-            </a:r>
-          </a:p>
-          <a:p>
-            <a:pPr lvl="2"/>
-            <a:r>
-              <a:rPr lang="en-US" sz="1600" dirty="0" smtClean="0"/>
-              <a:t>Domain per tenant, repository per tenant, </a:t>
-            </a:r>
-            <a:r>
-              <a:rPr lang="en-US" sz="1600" dirty="0" smtClean="0"/>
-              <a:t>hybrid</a:t>
-            </a:r>
-          </a:p>
-          <a:p>
-            <a:pPr lvl="1"/>
-            <a:r>
-              <a:rPr lang="en-US" sz="2000" dirty="0" smtClean="0"/>
-              <a:t>File </a:t>
-            </a:r>
-            <a:r>
-              <a:rPr lang="en-US" sz="2000" dirty="0" smtClean="0"/>
-              <a:t>system</a:t>
+              <a:t>File system</a:t>
             </a:r>
             <a:endParaRPr lang="en-US" sz="2800" dirty="0" smtClean="0"/>
           </a:p>
@@ -7761,7 +7744,6 @@
               <a:rPr lang="en-US" sz="2800" dirty="0" smtClean="0"/>
               <a:t>Metadata</a:t>
             </a:r>
-            <a:endParaRPr lang="en-US" sz="2800" dirty="0" smtClean="0"/>
           </a:p>
           <a:p>
             <a:pPr lvl="1"/>
@@ -7778,7 +7760,6 @@
               <a:rPr lang="en-US" sz="2800" dirty="0" smtClean="0"/>
               <a:t>Administration</a:t>
             </a:r>
-            <a:endParaRPr lang="en-US" sz="2800" dirty="0" smtClean="0"/>
           </a:p>
           <a:p>
             <a:pPr lvl="1"/>
@@ -7927,7 +7908,6 @@
               <a:rPr lang="en-US" dirty="0" smtClean="0"/>
               <a:t>Interfacing with Nuxeo</a:t>
             </a:r>
-            <a:endParaRPr lang="en-US" dirty="0" smtClean="0"/>
           </a:p>
           <a:p>
             <a:r>
@@ -7950,11 +7930,7 @@
             </a:r>
             <a:r>
               <a:rPr lang="en-US" dirty="0" smtClean="0"/>
-              <a:t> </a:t>
-            </a:r>
-            <a:r>
-              <a:rPr lang="en-US" dirty="0" smtClean="0"/>
-              <a:t>Resource</a:t>
+              <a:t> Resource</a:t>
             </a:r>
           </a:p>
           <a:p>
@@ -7966,11 +7942,7 @@
           <a:p>
             <a:r>
               <a:rPr lang="en-US" dirty="0" smtClean="0"/>
-              <a:t>Multi-tenancy </a:t>
-            </a:r>
-            <a:r>
-              <a:rPr lang="en-US" dirty="0" smtClean="0"/>
-              <a:t>aspects</a:t>
+              <a:t>Multi-tenancy aspects</a:t>
             </a:r>
           </a:p>
           <a:p>
@@ -8256,7 +8228,6 @@
               <a:rPr lang="en-US" sz="1600" dirty="0" smtClean="0"/>
               <a:t>Why?</a:t>
             </a:r>
-            <a:endParaRPr lang="en-US" sz="1600" dirty="0" smtClean="0"/>
           </a:p>
           <a:p>
             <a:r>
@@ -8277,21 +8248,8 @@
             </a:r>
             <a:r>
               <a:rPr lang="en-US" sz="1600" dirty="0" smtClean="0"/>
-              <a:t>(only supports document repository, no support for XML complex type, </a:t>
-            </a:r>
-            <a:r>
-              <a:rPr lang="en-US" sz="1600" dirty="0" smtClean="0"/>
-              <a:t>have to use export </a:t>
-            </a:r>
-            <a:r>
-              <a:rPr lang="en-US" sz="1600" dirty="0" smtClean="0"/>
-              <a:t>vs. </a:t>
-            </a:r>
-            <a:r>
-              <a:rPr lang="en-US" sz="1600" dirty="0" smtClean="0"/>
-              <a:t>get)</a:t>
-            </a:r>
-            <a:endParaRPr lang="en-US" sz="1600" dirty="0" smtClean="0"/>
+              <a:t>(only supports document repository, no support for XML complex type, have to use export vs. get)</a:t>
+            </a:r>
           </a:p>
           <a:p>
             <a:r>
@@ -8308,13 +8266,8 @@
             </a:r>
             <a:r>
               <a:rPr lang="en-US" sz="1600" dirty="0" smtClean="0"/>
-              <a:t>force to run inside the Nuxeo </a:t>
-            </a:r>
-            <a:r>
-              <a:rPr lang="en-US" sz="1600" dirty="0" smtClean="0"/>
-              <a:t>container</a:t>
-            </a:r>
-            <a:endParaRPr lang="en-US" sz="1600" dirty="0" smtClean="0"/>
+              <a:t>force to run inside the Nuxeo container</a:t>
+            </a:r>
           </a:p>
           <a:p>
             <a:r>
@@ -8335,15 +8288,7 @@
             </a:r>
             <a:r>
               <a:rPr lang="en-US" sz="1600" dirty="0" smtClean="0"/>
-              <a:t>was not possible due to </a:t>
-            </a:r>
-            <a:r>
-              <a:rPr lang="en-US" sz="1600" dirty="0" smtClean="0"/>
-              <a:t>class loading </a:t>
-            </a:r>
-            <a:r>
-              <a:rPr lang="en-US" sz="1600" dirty="0" smtClean="0"/>
-              <a:t>issues</a:t>
+              <a:t>was not possible due to class loading issues</a:t>
             </a:r>
             <a:endParaRPr lang="en-US" sz="1600" dirty="0"/>
           </a:p>
@@ -9437,7 +9382,6 @@
               <a:rPr lang="en-US" dirty="0" smtClean="0"/>
               <a:t>APIs</a:t>
             </a:r>
-            <a:endParaRPr lang="en-US" dirty="0" smtClean="0"/>
           </a:p>
           <a:p>
             <a:r>
@@ -9570,28 +9514,6 @@
           </a:p>
         </p:txBody>
       </p:sp>
-      <p:graphicFrame>
-        <p:nvGraphicFramePr>
-          <p:cNvPr id="8" name="Content Placeholder 7"/>
-          <p:cNvGraphicFramePr>
-            <a:graphicFrameLocks noChangeAspect="1"/>
-          </p:cNvGraphicFramePr>
-          <p:nvPr>
-            <p:ph sz="half" idx="1"/>
-          </p:nvPr>
-        </p:nvGraphicFramePr>
-        <p:xfrm>
-          <a:off x="457200" y="1524000"/>
-          <a:ext cx="4038600" cy="4200143"/>
-        </p:xfrm>
-        <a:graphic>
-          <a:graphicData uri="http://schemas.openxmlformats.org/presentationml/2006/ole">
-            <p:oleObj spid="_x0000_s2051" name="Visio" r:id="rId3" imgW="6124340" imgH="4092662" progId="Visio.Drawing.11">
-              <p:embed/>
-            </p:oleObj>
-          </a:graphicData>
-        </a:graphic>
-      </p:graphicFrame>
       <p:sp>
         <p:nvSpPr>
           <p:cNvPr id="4" name="Footer Placeholder 3"/>
@@ -9655,7 +9577,7 @@
         </p:xfrm>
         <a:graphic>
           <a:graphicData uri="http://schemas.openxmlformats.org/presentationml/2006/ole">
-            <p:oleObj spid="_x0000_s2052" name="Visio" r:id="rId4" imgW="6124340" imgH="4092662" progId="Visio.Drawing.11">
+            <p:oleObj spid="_x0000_s2052" name="Visio" r:id="rId3" imgW="6124340" imgH="4092662" progId="Visio.Drawing.11">
               <p:embed/>
             </p:oleObj>
           </a:graphicData>
@@ -9663,14 +9585,78 @@
       </p:graphicFrame>
       <p:sp>
         <p:nvSpPr>
+          <p:cNvPr id="11" name="Right Brace 10"/>
+          <p:cNvSpPr/>
+          <p:nvPr/>
+        </p:nvSpPr>
+        <p:spPr>
+          <a:xfrm>
+            <a:off x="4191000" y="2286000"/>
+            <a:ext cx="381000" cy="2286000"/>
+          </a:xfrm>
+          <a:prstGeom prst="rightBrace">
+            <a:avLst/>
+          </a:prstGeom>
+        </p:spPr>
+        <p:style>
+          <a:lnRef idx="1">
+            <a:schemeClr val="accent1"/>
+          </a:lnRef>
+          <a:fillRef idx="0">
+            <a:schemeClr val="accent1"/>
+          </a:fillRef>
+          <a:effectRef idx="0">
+            <a:schemeClr val="accent1"/>
+          </a:effectRef>
+          <a:fontRef idx="minor">
+            <a:schemeClr val="tx1"/>
+          </a:fontRef>
+        </p:style>
+        <p:txBody>
+          <a:bodyPr rtlCol="0" anchor="ctr"/>
+          <a:lstStyle/>
+          <a:p>
+            <a:pPr algn="ctr"/>
+            <a:endParaRPr lang="en-US"/>
+          </a:p>
+        </p:txBody>
+      </p:sp>
+      <p:pic>
+        <p:nvPicPr>
+          <p:cNvPr id="2053" name="Picture 5" descr="C:\Documents and Settings\sanjaydalal\My Documents\CSpace\Schema_extension_model.png"/>
+          <p:cNvPicPr>
+            <a:picLocks noChangeAspect="1" noChangeArrowheads="1"/>
+          </p:cNvPicPr>
+          <p:nvPr/>
+        </p:nvPicPr>
+        <p:blipFill>
+          <a:blip r:embed="rId4" cstate="print"/>
+          <a:srcRect/>
+          <a:stretch>
+            <a:fillRect/>
+          </a:stretch>
+        </p:blipFill>
+        <p:spPr bwMode="auto">
+          <a:xfrm>
+            <a:off x="381000" y="2143125"/>
+            <a:ext cx="4242134" cy="3190875"/>
+          </a:xfrm>
+          <a:prstGeom prst="rect">
+            <a:avLst/>
+          </a:prstGeom>
+          <a:noFill/>
+        </p:spPr>
+      </p:pic>
+      <p:sp>
+        <p:nvSpPr>
           <p:cNvPr id="10" name="Right Arrow 9"/>
           <p:cNvSpPr/>
           <p:nvPr/>
         </p:nvSpPr>
         <p:spPr>
           <a:xfrm>
-            <a:off x="4724400" y="3361943"/>
-            <a:ext cx="1600200" cy="484632"/>
+            <a:off x="4191000" y="3361943"/>
+            <a:ext cx="2133600" cy="484632"/>
           </a:xfrm>
           <a:prstGeom prst="rightArrow">
             <a:avLst>
@@ -9694,44 +9680,6 @@
           </a:effectRef>
           <a:fontRef idx="minor">
             <a:schemeClr val="lt1"/>
-          </a:fontRef>
-        </p:style>
-        <p:txBody>
-          <a:bodyPr rtlCol="0" anchor="ctr"/>
-          <a:lstStyle/>
-          <a:p>
-            <a:pPr algn="ctr"/>
-            <a:endParaRPr lang="en-US"/>
-          </a:p>
-        </p:txBody>
-      </p:sp>
-      <p:sp>
-        <p:nvSpPr>
-          <p:cNvPr id="11" name="Right Brace 10"/>
-          <p:cNvSpPr/>
-          <p:nvPr/>
-        </p:nvSpPr>
-        <p:spPr>
-          <a:xfrm>
-            <a:off x="4191000" y="1914143"/>
-            <a:ext cx="381000" cy="3429000"/>
-          </a:xfrm>
-          <a:prstGeom prst="rightBrace">
-            <a:avLst/>
-          </a:prstGeom>
-        </p:spPr>
-        <p:style>
-          <a:lnRef idx="1">
-            <a:schemeClr val="accent1"/>
-          </a:lnRef>
-          <a:fillRef idx="0">
-            <a:schemeClr val="accent1"/>
-          </a:fillRef>
-          <a:effectRef idx="0">
-            <a:schemeClr val="accent1"/>
-          </a:effectRef>
-          <a:fontRef idx="minor">
-            <a:schemeClr val="tx1"/>
           </a:fontRef>
         </p:style>
         <p:txBody>
@@ -10033,8 +9981,8 @@
       </p:par>
     </p:tnLst>
     <p:bldLst>
+      <p:bldP spid="11" grpId="0" animBg="1"/>
       <p:bldP spid="10" grpId="0" animBg="1"/>
-      <p:bldP spid="11" grpId="0" animBg="1"/>
     </p:bldLst>
   </p:timing>
 </p:sld>
@@ -10238,24 +10186,234 @@
                 </a:solidFill>
                 <a:latin typeface="Courier" pitchFamily="49" charset="0"/>
               </a:rPr>
+              <a:t>" prefix="</a:t>
+            </a:r>
+            <a:r>
+              <a:rPr lang="en-US" sz="1400" b="1" dirty="0" err="1" smtClean="0">
+                <a:solidFill>
+                  <a:srgbClr val="FF0000"/>
+                </a:solidFill>
+                <a:latin typeface="Courier" pitchFamily="49" charset="0"/>
+              </a:rPr>
+              <a:t>collectionobject</a:t>
+            </a:r>
+            <a:r>
+              <a:rPr lang="en-US" sz="1400" b="1" dirty="0" smtClean="0">
+                <a:solidFill>
+                  <a:srgbClr val="FF0000"/>
+                </a:solidFill>
+                <a:latin typeface="Courier" pitchFamily="49" charset="0"/>
+              </a:rPr>
+              <a:t>-common</a:t>
+            </a:r>
+            <a:r>
+              <a:rPr lang="en-US" sz="1400" b="1" dirty="0" smtClean="0">
+                <a:solidFill>
+                  <a:schemeClr val="accent2"/>
+                </a:solidFill>
+                <a:latin typeface="Courier" pitchFamily="49" charset="0"/>
+              </a:rPr>
               <a:t>" </a:t>
             </a:r>
             <a:r>
+              <a:rPr lang="en-US" sz="1400" b="1" dirty="0" err="1" smtClean="0">
+                <a:solidFill>
+                  <a:schemeClr val="accent2"/>
+                </a:solidFill>
+                <a:latin typeface="Courier" pitchFamily="49" charset="0"/>
+              </a:rPr>
+              <a:t>src</a:t>
+            </a:r>
+            <a:r>
               <a:rPr lang="en-US" sz="1400" b="1" dirty="0" smtClean="0">
                 <a:solidFill>
                   <a:schemeClr val="accent2"/>
                 </a:solidFill>
                 <a:latin typeface="Courier" pitchFamily="49" charset="0"/>
               </a:rPr>
-              <a:t>prefix="</a:t>
+              <a:t>="schemas/</a:t>
+            </a:r>
+            <a:r>
+              <a:rPr lang="en-US" sz="1400" b="1" dirty="0" smtClean="0">
+                <a:solidFill>
+                  <a:srgbClr val="FF0000"/>
+                </a:solidFill>
+                <a:latin typeface="Courier" pitchFamily="49" charset="0"/>
+              </a:rPr>
+              <a:t>collectionobject-common.xsd</a:t>
+            </a:r>
+            <a:r>
+              <a:rPr lang="en-US" sz="1400" b="1" dirty="0" smtClean="0">
+                <a:solidFill>
+                  <a:schemeClr val="accent2"/>
+                </a:solidFill>
+                <a:latin typeface="Courier" pitchFamily="49" charset="0"/>
+              </a:rPr>
+              <a:t>"/&gt;</a:t>
+            </a:r>
+          </a:p>
+          <a:p>
+            <a:pPr>
+              <a:buNone/>
+            </a:pPr>
+            <a:r>
+              <a:rPr lang="en-US" sz="1400" b="1" dirty="0" smtClean="0">
+                <a:solidFill>
+                  <a:schemeClr val="accent2"/>
+                </a:solidFill>
+                <a:latin typeface="Courier" pitchFamily="49" charset="0"/>
+              </a:rPr>
+              <a:t>    …</a:t>
+            </a:r>
+          </a:p>
+          <a:p>
+            <a:pPr>
+              <a:buNone/>
+            </a:pPr>
+            <a:r>
+              <a:rPr lang="en-US" sz="1400" b="1" dirty="0" smtClean="0">
+                <a:solidFill>
+                  <a:schemeClr val="accent2"/>
+                </a:solidFill>
+                <a:latin typeface="Courier" pitchFamily="49" charset="0"/>
+              </a:rPr>
+              <a:t>  /&gt;</a:t>
+            </a:r>
+          </a:p>
+          <a:p>
+            <a:pPr>
+              <a:buNone/>
+            </a:pPr>
+            <a:r>
+              <a:rPr lang="en-US" sz="1400" b="1" dirty="0" smtClean="0">
+                <a:solidFill>
+                  <a:schemeClr val="accent2"/>
+                </a:solidFill>
+                <a:latin typeface="Courier" pitchFamily="49" charset="0"/>
+              </a:rPr>
+              <a:t>  &lt;/extension&gt;</a:t>
+            </a:r>
+          </a:p>
+          <a:p>
+            <a:pPr>
+              <a:buNone/>
+            </a:pPr>
+            <a:r>
+              <a:rPr lang="en-US" sz="1400" b="1" dirty="0" smtClean="0">
+                <a:solidFill>
+                  <a:schemeClr val="accent2"/>
+                </a:solidFill>
+                <a:latin typeface="Courier" pitchFamily="49" charset="0"/>
+              </a:rPr>
+              <a:t>  &lt;extension target="</a:t>
             </a:r>
             <a:r>
               <a:rPr lang="en-US" sz="1400" b="1" dirty="0" err="1" smtClean="0">
                 <a:solidFill>
+                  <a:schemeClr val="accent2"/>
+                </a:solidFill>
+                <a:latin typeface="Courier" pitchFamily="49" charset="0"/>
+              </a:rPr>
+              <a:t>org.nuxeo.ecm.core.schema.TypeService</a:t>
+            </a:r>
+            <a:r>
+              <a:rPr lang="en-US" sz="1400" b="1" dirty="0" smtClean="0">
+                <a:solidFill>
+                  <a:schemeClr val="accent2"/>
+                </a:solidFill>
+                <a:latin typeface="Courier" pitchFamily="49" charset="0"/>
+              </a:rPr>
+              <a:t>" point="</a:t>
+            </a:r>
+            <a:r>
+              <a:rPr lang="en-US" sz="1400" b="1" dirty="0" err="1" smtClean="0">
+                <a:solidFill>
+                  <a:schemeClr val="accent2"/>
+                </a:solidFill>
+                <a:latin typeface="Courier" pitchFamily="49" charset="0"/>
+              </a:rPr>
+              <a:t>doctype</a:t>
+            </a:r>
+            <a:r>
+              <a:rPr lang="en-US" sz="1400" b="1" dirty="0" smtClean="0">
+                <a:solidFill>
+                  <a:schemeClr val="accent2"/>
+                </a:solidFill>
+                <a:latin typeface="Courier" pitchFamily="49" charset="0"/>
+              </a:rPr>
+              <a:t>"&gt;</a:t>
+            </a:r>
+          </a:p>
+          <a:p>
+            <a:pPr>
+              <a:buNone/>
+            </a:pPr>
+            <a:r>
+              <a:rPr lang="en-US" sz="1400" b="1" dirty="0" smtClean="0">
+                <a:solidFill>
+                  <a:schemeClr val="accent2"/>
+                </a:solidFill>
+                <a:latin typeface="Courier" pitchFamily="49" charset="0"/>
+              </a:rPr>
+              <a:t>    &lt;</a:t>
+            </a:r>
+            <a:r>
+              <a:rPr lang="en-US" sz="1400" b="1" dirty="0" err="1" smtClean="0">
+                <a:solidFill>
+                  <a:schemeClr val="accent2"/>
+                </a:solidFill>
+                <a:latin typeface="Courier" pitchFamily="49" charset="0"/>
+              </a:rPr>
+              <a:t>doctype</a:t>
+            </a:r>
+            <a:r>
+              <a:rPr lang="en-US" sz="1400" b="1" dirty="0" smtClean="0">
+                <a:solidFill>
+                  <a:schemeClr val="accent2"/>
+                </a:solidFill>
+                <a:latin typeface="Courier" pitchFamily="49" charset="0"/>
+              </a:rPr>
+              <a:t> name="</a:t>
+            </a:r>
+            <a:r>
+              <a:rPr lang="en-US" sz="1400" b="1" dirty="0" smtClean="0">
+                <a:solidFill>
                   <a:srgbClr val="FF0000"/>
                 </a:solidFill>
                 <a:latin typeface="Courier" pitchFamily="49" charset="0"/>
               </a:rPr>
+              <a:t>CollectionObject</a:t>
+            </a:r>
+            <a:r>
+              <a:rPr lang="en-US" sz="1400" b="1" dirty="0" smtClean="0">
+                <a:solidFill>
+                  <a:schemeClr val="accent2"/>
+                </a:solidFill>
+                <a:latin typeface="Courier" pitchFamily="49" charset="0"/>
+              </a:rPr>
+              <a:t>" extends="Document"&gt;</a:t>
+            </a:r>
+          </a:p>
+          <a:p>
+            <a:pPr>
+              <a:buNone/>
+            </a:pPr>
+            <a:r>
+              <a:rPr lang="en-US" sz="1400" b="1" dirty="0" smtClean="0">
+                <a:solidFill>
+                  <a:schemeClr val="accent2"/>
+                </a:solidFill>
+                <a:latin typeface="Courier" pitchFamily="49" charset="0"/>
+              </a:rPr>
+              <a:t>      &lt;schema name=“</a:t>
+            </a:r>
+            <a:r>
+              <a:rPr lang="en-US" sz="1400" b="1" dirty="0" err="1" smtClean="0">
+                <a:solidFill>
+                  <a:srgbClr val="FF0000"/>
+                </a:solidFill>
+                <a:latin typeface="Courier" pitchFamily="49" charset="0"/>
+              </a:rPr>
               <a:t>collectionobject</a:t>
             </a:r>
             <a:r>
@@ -10274,266 +10432,8 @@
                 </a:solidFill>
                 <a:latin typeface="Courier" pitchFamily="49" charset="0"/>
               </a:rPr>
-              <a:t>" </a:t>
-            </a:r>
-            <a:r>
-              <a:rPr lang="en-US" sz="1400" b="1" dirty="0" err="1" smtClean="0">
-                <a:solidFill>
-                  <a:schemeClr val="accent2"/>
-                </a:solidFill>
-                <a:latin typeface="Courier" pitchFamily="49" charset="0"/>
-              </a:rPr>
-              <a:t>src</a:t>
-            </a:r>
-            <a:r>
-              <a:rPr lang="en-US" sz="1400" b="1" dirty="0" smtClean="0">
-                <a:solidFill>
-                  <a:schemeClr val="accent2"/>
-                </a:solidFill>
-                <a:latin typeface="Courier" pitchFamily="49" charset="0"/>
-              </a:rPr>
-              <a:t>="</a:t>
-            </a:r>
-            <a:r>
-              <a:rPr lang="en-US" sz="1400" b="1" dirty="0" smtClean="0">
-                <a:solidFill>
-                  <a:schemeClr val="accent2"/>
-                </a:solidFill>
-                <a:latin typeface="Courier" pitchFamily="49" charset="0"/>
-              </a:rPr>
-              <a:t>schemas/</a:t>
-            </a:r>
-            <a:r>
-              <a:rPr lang="en-US" sz="1400" b="1" dirty="0" smtClean="0">
-                <a:solidFill>
-                  <a:srgbClr val="FF0000"/>
-                </a:solidFill>
-                <a:latin typeface="Courier" pitchFamily="49" charset="0"/>
-              </a:rPr>
-              <a:t>collectionobject-common.xsd</a:t>
-            </a:r>
-            <a:r>
-              <a:rPr lang="en-US" sz="1400" b="1" dirty="0" smtClean="0">
-                <a:solidFill>
-                  <a:schemeClr val="accent2"/>
-                </a:solidFill>
-                <a:latin typeface="Courier" pitchFamily="49" charset="0"/>
-              </a:rPr>
-              <a:t>"/&gt;</a:t>
-            </a:r>
-          </a:p>
-          <a:p>
-            <a:pPr>
-              <a:buNone/>
-            </a:pPr>
-            <a:r>
-              <a:rPr lang="en-US" sz="1400" b="1" dirty="0" smtClean="0">
-                <a:solidFill>
-                  <a:schemeClr val="accent2"/>
-                </a:solidFill>
-                <a:latin typeface="Courier" pitchFamily="49" charset="0"/>
-              </a:rPr>
-              <a:t> </a:t>
-            </a:r>
-            <a:r>
-              <a:rPr lang="en-US" sz="1400" b="1" dirty="0" smtClean="0">
-                <a:solidFill>
-                  <a:schemeClr val="accent2"/>
-                </a:solidFill>
-                <a:latin typeface="Courier" pitchFamily="49" charset="0"/>
-              </a:rPr>
-              <a:t>   …</a:t>
-            </a:r>
-          </a:p>
-          <a:p>
-            <a:pPr>
-              <a:buNone/>
-            </a:pPr>
-            <a:r>
-              <a:rPr lang="en-US" sz="1400" b="1" dirty="0" smtClean="0">
-                <a:solidFill>
-                  <a:schemeClr val="accent2"/>
-                </a:solidFill>
-                <a:latin typeface="Courier" pitchFamily="49" charset="0"/>
-              </a:rPr>
-              <a:t> </a:t>
-            </a:r>
-            <a:r>
-              <a:rPr lang="en-US" sz="1400" b="1" dirty="0" smtClean="0">
-                <a:solidFill>
-                  <a:schemeClr val="accent2"/>
-                </a:solidFill>
-                <a:latin typeface="Courier" pitchFamily="49" charset="0"/>
-              </a:rPr>
-              <a:t> /&gt;</a:t>
-            </a:r>
-            <a:endParaRPr lang="en-US" sz="1400" b="1" dirty="0" smtClean="0">
-              <a:solidFill>
-                <a:schemeClr val="accent2"/>
-              </a:solidFill>
-              <a:latin typeface="Courier" pitchFamily="49" charset="0"/>
-            </a:endParaRPr>
-          </a:p>
-          <a:p>
-            <a:pPr>
-              <a:buNone/>
-            </a:pPr>
-            <a:r>
-              <a:rPr lang="en-US" sz="1400" b="1" dirty="0" smtClean="0">
-                <a:solidFill>
-                  <a:schemeClr val="accent2"/>
-                </a:solidFill>
-                <a:latin typeface="Courier" pitchFamily="49" charset="0"/>
-              </a:rPr>
-              <a:t>  &lt;/extension&gt;</a:t>
-            </a:r>
-          </a:p>
-          <a:p>
-            <a:pPr>
-              <a:buNone/>
-            </a:pPr>
-            <a:r>
-              <a:rPr lang="en-US" sz="1400" b="1" dirty="0" smtClean="0">
-                <a:solidFill>
-                  <a:schemeClr val="accent2"/>
-                </a:solidFill>
-                <a:latin typeface="Courier" pitchFamily="49" charset="0"/>
-              </a:rPr>
-              <a:t>  &lt;extension target="</a:t>
-            </a:r>
-            <a:r>
-              <a:rPr lang="en-US" sz="1400" b="1" dirty="0" err="1" smtClean="0">
-                <a:solidFill>
-                  <a:schemeClr val="accent2"/>
-                </a:solidFill>
-                <a:latin typeface="Courier" pitchFamily="49" charset="0"/>
-              </a:rPr>
-              <a:t>org.nuxeo.ecm.core.schema.TypeService</a:t>
-            </a:r>
-            <a:r>
-              <a:rPr lang="en-US" sz="1400" b="1" dirty="0" smtClean="0">
-                <a:solidFill>
-                  <a:schemeClr val="accent2"/>
-                </a:solidFill>
-                <a:latin typeface="Courier" pitchFamily="49" charset="0"/>
-              </a:rPr>
-              <a:t>" point="</a:t>
-            </a:r>
-            <a:r>
-              <a:rPr lang="en-US" sz="1400" b="1" dirty="0" err="1" smtClean="0">
-                <a:solidFill>
-                  <a:schemeClr val="accent2"/>
-                </a:solidFill>
-                <a:latin typeface="Courier" pitchFamily="49" charset="0"/>
-              </a:rPr>
-              <a:t>doctype</a:t>
-            </a:r>
-            <a:r>
-              <a:rPr lang="en-US" sz="1400" b="1" dirty="0" smtClean="0">
-                <a:solidFill>
-                  <a:schemeClr val="accent2"/>
-                </a:solidFill>
-                <a:latin typeface="Courier" pitchFamily="49" charset="0"/>
-              </a:rPr>
-              <a:t>"&gt;</a:t>
-            </a:r>
-          </a:p>
-          <a:p>
-            <a:pPr>
-              <a:buNone/>
-            </a:pPr>
-            <a:r>
-              <a:rPr lang="en-US" sz="1400" b="1" dirty="0" smtClean="0">
-                <a:solidFill>
-                  <a:schemeClr val="accent2"/>
-                </a:solidFill>
-                <a:latin typeface="Courier" pitchFamily="49" charset="0"/>
-              </a:rPr>
-              <a:t>    &lt;</a:t>
-            </a:r>
-            <a:r>
-              <a:rPr lang="en-US" sz="1400" b="1" dirty="0" err="1" smtClean="0">
-                <a:solidFill>
-                  <a:schemeClr val="accent2"/>
-                </a:solidFill>
-                <a:latin typeface="Courier" pitchFamily="49" charset="0"/>
-              </a:rPr>
-              <a:t>doctype</a:t>
-            </a:r>
-            <a:r>
-              <a:rPr lang="en-US" sz="1400" b="1" dirty="0" smtClean="0">
-                <a:solidFill>
-                  <a:schemeClr val="accent2"/>
-                </a:solidFill>
-                <a:latin typeface="Courier" pitchFamily="49" charset="0"/>
-              </a:rPr>
-              <a:t> name="</a:t>
-            </a:r>
-            <a:r>
-              <a:rPr lang="en-US" sz="1400" b="1" dirty="0" smtClean="0">
-                <a:solidFill>
-                  <a:srgbClr val="FF0000"/>
-                </a:solidFill>
-                <a:latin typeface="Courier" pitchFamily="49" charset="0"/>
-              </a:rPr>
-              <a:t>CollectionObject</a:t>
-            </a:r>
-            <a:r>
-              <a:rPr lang="en-US" sz="1400" b="1" dirty="0" smtClean="0">
-                <a:solidFill>
-                  <a:schemeClr val="accent2"/>
-                </a:solidFill>
-                <a:latin typeface="Courier" pitchFamily="49" charset="0"/>
-              </a:rPr>
-              <a:t>" extends="Document"&gt;</a:t>
-            </a:r>
-          </a:p>
-          <a:p>
-            <a:pPr>
-              <a:buNone/>
-            </a:pPr>
-            <a:r>
-              <a:rPr lang="en-US" sz="1400" b="1" dirty="0" smtClean="0">
-                <a:solidFill>
-                  <a:schemeClr val="accent2"/>
-                </a:solidFill>
-                <a:latin typeface="Courier" pitchFamily="49" charset="0"/>
-              </a:rPr>
-              <a:t>      &lt;schema name=“</a:t>
-            </a:r>
-            <a:r>
-              <a:rPr lang="en-US" sz="1400" b="1" dirty="0" err="1" smtClean="0">
-                <a:solidFill>
-                  <a:srgbClr val="FF0000"/>
-                </a:solidFill>
-                <a:latin typeface="Courier" pitchFamily="49" charset="0"/>
-              </a:rPr>
-              <a:t>collectionobject</a:t>
-            </a:r>
-            <a:r>
-              <a:rPr lang="en-US" sz="1400" b="1" dirty="0" smtClean="0">
-                <a:solidFill>
-                  <a:srgbClr val="FF0000"/>
-                </a:solidFill>
-                <a:latin typeface="Courier" pitchFamily="49" charset="0"/>
-              </a:rPr>
-              <a:t>-common</a:t>
-            </a:r>
-            <a:r>
-              <a:rPr lang="en-US" sz="1400" b="1" dirty="0" smtClean="0">
-                <a:solidFill>
-                  <a:schemeClr val="accent2"/>
-                </a:solidFill>
-                <a:latin typeface="Courier" pitchFamily="49" charset="0"/>
-              </a:rPr>
               <a:t>"/&gt; </a:t>
             </a:r>
-            <a:endParaRPr lang="en-US" sz="1400" b="1" dirty="0" smtClean="0">
-              <a:solidFill>
-                <a:schemeClr val="accent2"/>
-              </a:solidFill>
-              <a:latin typeface="Courier" pitchFamily="49" charset="0"/>
-            </a:endParaRPr>
           </a:p>
           <a:p>
             <a:pPr>
@@ -10889,23 +10789,8 @@
                 </a:solidFill>
                 <a:latin typeface="Courier" pitchFamily="49" charset="0"/>
               </a:rPr>
-              <a:t>="http://</a:t>
-            </a:r>
-            <a:r>
-              <a:rPr lang="en-US" sz="1400" b="1" dirty="0" smtClean="0">
-                <a:solidFill>
-                  <a:schemeClr val="accent2"/>
-                </a:solidFill>
-                <a:latin typeface="Courier" pitchFamily="49" charset="0"/>
-              </a:rPr>
-              <a:t>collectionspace.org/collectionobject/"</a:t>
-            </a:r>
-            <a:endParaRPr lang="en-US" sz="1400" b="1" dirty="0" smtClean="0">
-              <a:solidFill>
-                <a:schemeClr val="accent2"/>
-              </a:solidFill>
-              <a:latin typeface="Courier" pitchFamily="49" charset="0"/>
-            </a:endParaRPr>
+              <a:t>="http://collectionspace.org/collectionobject/"</a:t>
+            </a:r>
           </a:p>
           <a:p>
             <a:pPr>
@@ -11755,34 +11640,7 @@
                 </a:solidFill>
                 <a:latin typeface="Courier" pitchFamily="49" charset="0"/>
               </a:rPr>
-              <a:t>@</a:t>
-            </a:r>
-            <a:r>
-              <a:rPr lang="en-US" sz="1400" b="1" dirty="0" smtClean="0">
-                <a:solidFill>
-                  <a:srgbClr val="FF0000"/>
-                </a:solidFill>
-                <a:latin typeface="Courier" pitchFamily="49" charset="0"/>
-              </a:rPr>
-              <a:t>Consumes("</a:t>
-            </a:r>
-            <a:r>
-              <a:rPr lang="en-US" sz="1400" b="1" dirty="0" smtClean="0">
-                <a:solidFill>
-                  <a:srgbClr val="FF0000"/>
-                </a:solidFill>
-                <a:latin typeface="Courier" pitchFamily="49" charset="0"/>
-              </a:rPr>
-              <a:t>application/xml“) @</a:t>
-            </a:r>
-            <a:r>
-              <a:rPr lang="en-US" sz="1400" b="1" dirty="0" smtClean="0">
-                <a:solidFill>
-                  <a:srgbClr val="FF0000"/>
-                </a:solidFill>
-                <a:latin typeface="Courier" pitchFamily="49" charset="0"/>
-              </a:rPr>
-              <a:t>Produces("application/xml")</a:t>
+              <a:t>@Consumes("application/xml“) @Produces("application/xml")</a:t>
             </a:r>
           </a:p>
           <a:p>
@@ -11866,22 +11724,31 @@
                 </a:solidFill>
                 <a:latin typeface="Courier" pitchFamily="49" charset="0"/>
               </a:rPr>
-              <a:t>@</a:t>
-            </a:r>
+              <a:t>@POST</a:t>
+            </a:r>
+          </a:p>
+          <a:p>
+            <a:pPr>
+              <a:buNone/>
+            </a:pPr>
             <a:r>
               <a:rPr lang="en-US" sz="1400" b="1" dirty="0" smtClean="0">
                 <a:solidFill>
-                  <a:srgbClr val="FF0000"/>
-                </a:solidFill>
-                <a:latin typeface="Courier" pitchFamily="49" charset="0"/>
-              </a:rPr>
-              <a:t>POST</a:t>
-            </a:r>
-          </a:p>
-          <a:p>
-            <a:pPr>
-              <a:buNone/>
-            </a:pPr>
+                  <a:schemeClr val="accent2"/>
+                </a:solidFill>
+                <a:latin typeface="Courier" pitchFamily="49" charset="0"/>
+              </a:rPr>
+              <a:t>	public Response </a:t>
+            </a:r>
+            <a:r>
+              <a:rPr lang="en-US" sz="1400" b="1" dirty="0" err="1" smtClean="0">
+                <a:solidFill>
+                  <a:schemeClr val="accent2"/>
+                </a:solidFill>
+                <a:latin typeface="Courier" pitchFamily="49" charset="0"/>
+              </a:rPr>
+              <a:t>createCollectionObject</a:t>
+            </a:r>
             <a:r>
               <a:rPr lang="en-US" sz="1400" b="1" dirty="0" smtClean="0">
                 <a:solidFill>
@@ -11889,34 +11756,7 @@
                 </a:solidFill>
                 <a:latin typeface="Courier" pitchFamily="49" charset="0"/>
               </a:rPr>
-              <a:t>	public Response </a:t>
-            </a:r>
-            <a:r>
-              <a:rPr lang="en-US" sz="1400" b="1" dirty="0" err="1" smtClean="0">
-                <a:solidFill>
-                  <a:schemeClr val="accent2"/>
-                </a:solidFill>
-                <a:latin typeface="Courier" pitchFamily="49" charset="0"/>
-              </a:rPr>
-              <a:t>createCollectionObject</a:t>
-            </a:r>
-            <a:r>
-              <a:rPr lang="en-US" sz="1400" b="1" dirty="0" smtClean="0">
-                <a:solidFill>
-                  <a:schemeClr val="accent2"/>
-                </a:solidFill>
-                <a:latin typeface="Courier" pitchFamily="49" charset="0"/>
-              </a:rPr>
-              <a:t>(CollectionObject co) { … </a:t>
-            </a:r>
-            <a:r>
-              <a:rPr lang="en-US" sz="1400" b="1" dirty="0" smtClean="0">
-                <a:solidFill>
-                  <a:schemeClr val="accent2"/>
-                </a:solidFill>
-                <a:latin typeface="Courier" pitchFamily="49" charset="0"/>
-              </a:rPr>
-              <a:t>}</a:t>
+              <a:t>(CollectionObject co) { … }</a:t>
             </a:r>
           </a:p>
           <a:p>
@@ -11950,31 +11790,113 @@
                 </a:solidFill>
                 <a:latin typeface="Courier" pitchFamily="49" charset="0"/>
               </a:rPr>
+              <a:t>@GET @Path("{id}")</a:t>
+            </a:r>
+          </a:p>
+          <a:p>
+            <a:pPr>
+              <a:buNone/>
+            </a:pPr>
+            <a:r>
+              <a:rPr lang="en-US" sz="1400" b="1" dirty="0" smtClean="0">
+                <a:solidFill>
+                  <a:schemeClr val="accent2"/>
+                </a:solidFill>
+                <a:latin typeface="Courier" pitchFamily="49" charset="0"/>
+              </a:rPr>
+              <a:t>	public CollectionObject </a:t>
+            </a:r>
+            <a:r>
+              <a:rPr lang="en-US" sz="1400" b="1" dirty="0" err="1" smtClean="0">
+                <a:solidFill>
+                  <a:schemeClr val="accent2"/>
+                </a:solidFill>
+                <a:latin typeface="Courier" pitchFamily="49" charset="0"/>
+              </a:rPr>
+              <a:t>getCollectionObject</a:t>
+            </a:r>
+            <a:r>
+              <a:rPr lang="en-US" sz="1400" b="1" dirty="0" smtClean="0">
+                <a:solidFill>
+                  <a:schemeClr val="accent2"/>
+                </a:solidFill>
+                <a:latin typeface="Courier" pitchFamily="49" charset="0"/>
+              </a:rPr>
+              <a:t>(</a:t>
+            </a:r>
+            <a:r>
+              <a:rPr lang="en-US" sz="1400" b="1" dirty="0" smtClean="0">
+                <a:solidFill>
+                  <a:srgbClr val="FF0000"/>
+                </a:solidFill>
+                <a:latin typeface="Courier" pitchFamily="49" charset="0"/>
+              </a:rPr>
               <a:t>@</a:t>
             </a:r>
             <a:r>
+              <a:rPr lang="en-US" sz="1400" b="1" dirty="0" err="1" smtClean="0">
+                <a:solidFill>
+                  <a:srgbClr val="FF0000"/>
+                </a:solidFill>
+                <a:latin typeface="Courier" pitchFamily="49" charset="0"/>
+              </a:rPr>
+              <a:t>PathParam</a:t>
+            </a:r>
+            <a:r>
               <a:rPr lang="en-US" sz="1400" b="1" dirty="0" smtClean="0">
                 <a:solidFill>
                   <a:srgbClr val="FF0000"/>
                 </a:solidFill>
                 <a:latin typeface="Courier" pitchFamily="49" charset="0"/>
               </a:rPr>
-              <a:t>GET @Path</a:t>
+              <a:t>("id") </a:t>
             </a:r>
             <a:r>
               <a:rPr lang="en-US" sz="1400" b="1" dirty="0" smtClean="0">
                 <a:solidFill>
+                  <a:schemeClr val="accent2"/>
+                </a:solidFill>
+                <a:latin typeface="Courier" pitchFamily="49" charset="0"/>
+              </a:rPr>
+              <a:t>String id) { .. }</a:t>
+            </a:r>
+          </a:p>
+          <a:p>
+            <a:pPr>
+              <a:buNone/>
+            </a:pPr>
+            <a:r>
+              <a:rPr lang="en-US" sz="1400" b="1" dirty="0" smtClean="0">
+                <a:solidFill>
+                  <a:schemeClr val="accent2"/>
+                </a:solidFill>
+                <a:latin typeface="Courier" pitchFamily="49" charset="0"/>
+              </a:rPr>
+              <a:t>	</a:t>
+            </a:r>
+          </a:p>
+          <a:p>
+            <a:pPr>
+              <a:buNone/>
+            </a:pPr>
+            <a:r>
+              <a:rPr lang="en-US" sz="1400" b="1" dirty="0" smtClean="0">
+                <a:solidFill>
+                  <a:schemeClr val="accent2"/>
+                </a:solidFill>
+                <a:latin typeface="Courier" pitchFamily="49" charset="0"/>
+              </a:rPr>
+              <a:t>   </a:t>
+            </a:r>
+            <a:r>
+              <a:rPr lang="en-US" sz="1400" b="1" dirty="0" smtClean="0">
+                <a:solidFill>
                   <a:srgbClr val="FF0000"/>
                 </a:solidFill>
                 <a:latin typeface="Courier" pitchFamily="49" charset="0"/>
               </a:rPr>
-              <a:t>("{id}")</a:t>
-            </a:r>
-          </a:p>
-          <a:p>
-            <a:pPr>
-              <a:buNone/>
-            </a:pPr>
+              <a:t>@PUT </a:t>
+            </a:r>
             <a:r>
               <a:rPr lang="en-US" sz="1400" b="1" dirty="0" smtClean="0">
                 <a:solidFill>
@@ -11982,6 +11904,20 @@
                 </a:solidFill>
                 <a:latin typeface="Courier" pitchFamily="49" charset="0"/>
               </a:rPr>
+              <a:t>@Path("{id}")</a:t>
+            </a:r>
+          </a:p>
+          <a:p>
+            <a:pPr>
+              <a:buNone/>
+            </a:pPr>
+            <a:r>
+              <a:rPr lang="en-US" sz="1400" b="1" dirty="0" smtClean="0">
+                <a:solidFill>
+                  <a:schemeClr val="accent2"/>
+                </a:solidFill>
+                <a:latin typeface="Courier" pitchFamily="49" charset="0"/>
+              </a:rPr>
               <a:t>	public CollectionObject </a:t>
             </a:r>
             <a:r>
@@ -11991,7 +11927,7 @@
                 </a:solidFill>
                 <a:latin typeface="Courier" pitchFamily="49" charset="0"/>
               </a:rPr>
-              <a:t>getCollectionObject</a:t>
+              <a:t>updateCollectionObject</a:t>
             </a:r>
             <a:r>
               <a:rPr lang="en-US" sz="1400" b="1" dirty="0" smtClean="0">
@@ -12000,221 +11936,89 @@
                 </a:solidFill>
                 <a:latin typeface="Courier" pitchFamily="49" charset="0"/>
               </a:rPr>
-              <a:t>(</a:t>
+              <a:t>(@</a:t>
+            </a:r>
+            <a:r>
+              <a:rPr lang="en-US" sz="1400" b="1" dirty="0" err="1" smtClean="0">
+                <a:solidFill>
+                  <a:schemeClr val="accent2"/>
+                </a:solidFill>
+                <a:latin typeface="Courier" pitchFamily="49" charset="0"/>
+              </a:rPr>
+              <a:t>PathParam</a:t>
             </a:r>
             <a:r>
               <a:rPr lang="en-US" sz="1400" b="1" dirty="0" smtClean="0">
                 <a:solidFill>
+                  <a:schemeClr val="accent2"/>
+                </a:solidFill>
+                <a:latin typeface="Courier" pitchFamily="49" charset="0"/>
+              </a:rPr>
+              <a:t>("id") String id, CollectionObject </a:t>
+            </a:r>
+            <a:r>
+              <a:rPr lang="en-US" sz="1400" b="1" dirty="0" err="1" smtClean="0">
+                <a:solidFill>
+                  <a:schemeClr val="accent2"/>
+                </a:solidFill>
+                <a:latin typeface="Courier" pitchFamily="49" charset="0"/>
+              </a:rPr>
+              <a:t>theUpdate</a:t>
+            </a:r>
+            <a:r>
+              <a:rPr lang="en-US" sz="1400" b="1" dirty="0" smtClean="0">
+                <a:solidFill>
+                  <a:schemeClr val="accent2"/>
+                </a:solidFill>
+                <a:latin typeface="Courier" pitchFamily="49" charset="0"/>
+              </a:rPr>
+              <a:t>) { … }</a:t>
+            </a:r>
+          </a:p>
+          <a:p>
+            <a:pPr>
+              <a:buNone/>
+            </a:pPr>
+            <a:r>
+              <a:rPr lang="en-US" sz="1400" b="1" dirty="0" smtClean="0">
+                <a:solidFill>
+                  <a:schemeClr val="accent2"/>
+                </a:solidFill>
+                <a:latin typeface="Courier" pitchFamily="49" charset="0"/>
+              </a:rPr>
+              <a:t>	</a:t>
+            </a:r>
+          </a:p>
+          <a:p>
+            <a:pPr>
+              <a:buNone/>
+            </a:pPr>
+            <a:r>
+              <a:rPr lang="en-US" sz="1400" b="1" dirty="0" smtClean="0">
+                <a:solidFill>
+                  <a:schemeClr val="accent2"/>
+                </a:solidFill>
+                <a:latin typeface="Courier" pitchFamily="49" charset="0"/>
+              </a:rPr>
+              <a:t>   </a:t>
+            </a:r>
+            <a:r>
+              <a:rPr lang="en-US" sz="1400" b="1" dirty="0" smtClean="0">
+                <a:solidFill>
                   <a:srgbClr val="FF0000"/>
                 </a:solidFill>
                 <a:latin typeface="Courier" pitchFamily="49" charset="0"/>
               </a:rPr>
-              <a:t>@</a:t>
-            </a:r>
-            <a:r>
-              <a:rPr lang="en-US" sz="1400" b="1" dirty="0" err="1" smtClean="0">
-                <a:solidFill>
-                  <a:srgbClr val="FF0000"/>
-                </a:solidFill>
-                <a:latin typeface="Courier" pitchFamily="49" charset="0"/>
-              </a:rPr>
-              <a:t>PathParam</a:t>
+              <a:t>@DELETE </a:t>
             </a:r>
             <a:r>
               <a:rPr lang="en-US" sz="1400" b="1" dirty="0" smtClean="0">
                 <a:solidFill>
-                  <a:srgbClr val="FF0000"/>
-                </a:solidFill>
-                <a:latin typeface="Courier" pitchFamily="49" charset="0"/>
-              </a:rPr>
-              <a:t>("id") </a:t>
-            </a:r>
-            <a:r>
-              <a:rPr lang="en-US" sz="1400" b="1" dirty="0" smtClean="0">
-                <a:solidFill>
-                  <a:schemeClr val="accent2"/>
-                </a:solidFill>
-                <a:latin typeface="Courier" pitchFamily="49" charset="0"/>
-              </a:rPr>
-              <a:t>String id) { .. }</a:t>
-            </a:r>
-          </a:p>
-          <a:p>
-            <a:pPr>
-              <a:buNone/>
-            </a:pPr>
-            <a:r>
-              <a:rPr lang="en-US" sz="1400" b="1" dirty="0" smtClean="0">
-                <a:solidFill>
-                  <a:schemeClr val="accent2"/>
-                </a:solidFill>
-                <a:latin typeface="Courier" pitchFamily="49" charset="0"/>
-              </a:rPr>
-              <a:t>	</a:t>
-            </a:r>
-          </a:p>
-          <a:p>
-            <a:pPr>
-              <a:buNone/>
-            </a:pPr>
-            <a:r>
-              <a:rPr lang="en-US" sz="1400" b="1" dirty="0" smtClean="0">
-                <a:solidFill>
-                  <a:schemeClr val="accent2"/>
-                </a:solidFill>
-                <a:latin typeface="Courier" pitchFamily="49" charset="0"/>
-              </a:rPr>
-              <a:t>   </a:t>
-            </a:r>
-            <a:r>
-              <a:rPr lang="en-US" sz="1400" b="1" dirty="0" smtClean="0">
-                <a:solidFill>
-                  <a:srgbClr val="FF0000"/>
-                </a:solidFill>
-                <a:latin typeface="Courier" pitchFamily="49" charset="0"/>
-              </a:rPr>
-              <a:t>@PUT </a:t>
-            </a:r>
-            <a:r>
-              <a:rPr lang="en-US" sz="1400" b="1" dirty="0" smtClean="0">
-                <a:solidFill>
-                  <a:schemeClr val="accent2"/>
-                </a:solidFill>
-                <a:latin typeface="Courier" pitchFamily="49" charset="0"/>
-              </a:rPr>
-              <a:t>@</a:t>
-            </a:r>
-            <a:r>
-              <a:rPr lang="en-US" sz="1400" b="1" dirty="0" smtClean="0">
-                <a:solidFill>
-                  <a:schemeClr val="accent2"/>
-                </a:solidFill>
-                <a:latin typeface="Courier" pitchFamily="49" charset="0"/>
-              </a:rPr>
-              <a:t>Path("{id}")</a:t>
-            </a:r>
-          </a:p>
-          <a:p>
-            <a:pPr>
-              <a:buNone/>
-            </a:pPr>
-            <a:r>
-              <a:rPr lang="en-US" sz="1400" b="1" dirty="0" smtClean="0">
-                <a:solidFill>
-                  <a:schemeClr val="accent2"/>
-                </a:solidFill>
-                <a:latin typeface="Courier" pitchFamily="49" charset="0"/>
-              </a:rPr>
-              <a:t>	public CollectionObject </a:t>
-            </a:r>
-            <a:r>
-              <a:rPr lang="en-US" sz="1400" b="1" dirty="0" err="1" smtClean="0">
-                <a:solidFill>
-                  <a:schemeClr val="accent2"/>
-                </a:solidFill>
-                <a:latin typeface="Courier" pitchFamily="49" charset="0"/>
-              </a:rPr>
-              <a:t>updateCollectionObject</a:t>
-            </a:r>
-            <a:r>
-              <a:rPr lang="en-US" sz="1400" b="1" dirty="0" smtClean="0">
-                <a:solidFill>
-                  <a:schemeClr val="accent2"/>
-                </a:solidFill>
-                <a:latin typeface="Courier" pitchFamily="49" charset="0"/>
-              </a:rPr>
-              <a:t>(@</a:t>
-            </a:r>
-            <a:r>
-              <a:rPr lang="en-US" sz="1400" b="1" dirty="0" err="1" smtClean="0">
-                <a:solidFill>
-                  <a:schemeClr val="accent2"/>
-                </a:solidFill>
-                <a:latin typeface="Courier" pitchFamily="49" charset="0"/>
-              </a:rPr>
-              <a:t>PathParam</a:t>
-            </a:r>
-            <a:r>
-              <a:rPr lang="en-US" sz="1400" b="1" dirty="0" smtClean="0">
-                <a:solidFill>
-                  <a:schemeClr val="accent2"/>
-                </a:solidFill>
-                <a:latin typeface="Courier" pitchFamily="49" charset="0"/>
-              </a:rPr>
-              <a:t>("id") String id, CollectionObject </a:t>
-            </a:r>
-            <a:r>
-              <a:rPr lang="en-US" sz="1400" b="1" dirty="0" err="1" smtClean="0">
-                <a:solidFill>
-                  <a:schemeClr val="accent2"/>
-                </a:solidFill>
-                <a:latin typeface="Courier" pitchFamily="49" charset="0"/>
-              </a:rPr>
-              <a:t>theUpdate</a:t>
-            </a:r>
-            <a:r>
-              <a:rPr lang="en-US" sz="1400" b="1" dirty="0" smtClean="0">
-                <a:solidFill>
-                  <a:schemeClr val="accent2"/>
-                </a:solidFill>
-                <a:latin typeface="Courier" pitchFamily="49" charset="0"/>
-              </a:rPr>
-              <a:t>) { … }</a:t>
-            </a:r>
-          </a:p>
-          <a:p>
-            <a:pPr>
-              <a:buNone/>
-            </a:pPr>
-            <a:r>
-              <a:rPr lang="en-US" sz="1400" b="1" dirty="0" smtClean="0">
-                <a:solidFill>
-                  <a:schemeClr val="accent2"/>
-                </a:solidFill>
-                <a:latin typeface="Courier" pitchFamily="49" charset="0"/>
-              </a:rPr>
-              <a:t>	</a:t>
-            </a:r>
-          </a:p>
-          <a:p>
-            <a:pPr>
-              <a:buNone/>
-            </a:pPr>
-            <a:r>
-              <a:rPr lang="en-US" sz="1400" b="1" dirty="0" smtClean="0">
-                <a:solidFill>
-                  <a:schemeClr val="accent2"/>
-                </a:solidFill>
-                <a:latin typeface="Courier" pitchFamily="49" charset="0"/>
-              </a:rPr>
-              <a:t>   </a:t>
-            </a:r>
-            <a:r>
-              <a:rPr lang="en-US" sz="1400" b="1" dirty="0" smtClean="0">
-                <a:solidFill>
-                  <a:srgbClr val="FF0000"/>
-                </a:solidFill>
-                <a:latin typeface="Courier" pitchFamily="49" charset="0"/>
-              </a:rPr>
-              <a:t>@DELETE </a:t>
-            </a:r>
-            <a:r>
-              <a:rPr lang="en-US" sz="1400" b="1" dirty="0" smtClean="0">
-                <a:solidFill>
-                  <a:schemeClr val="accent2"/>
-                </a:solidFill>
-                <a:latin typeface="Courier" pitchFamily="49" charset="0"/>
-              </a:rPr>
-              <a:t>@Path</a:t>
-            </a:r>
-            <a:r>
-              <a:rPr lang="en-US" sz="1400" b="1" dirty="0" smtClean="0">
-                <a:solidFill>
-                  <a:schemeClr val="accent2"/>
-                </a:solidFill>
-                <a:latin typeface="Courier" pitchFamily="49" charset="0"/>
-              </a:rPr>
-              <a:t>("{id}")</a:t>
+                  <a:schemeClr val="accent2"/>
+                </a:solidFill>
+                <a:latin typeface="Courier" pitchFamily="49" charset="0"/>
+              </a:rPr>
+              <a:t>@Path("{id}")</a:t>
             </a:r>
           </a:p>
           <a:p>
@@ -12289,8 +12093,13 @@
                 </a:solidFill>
                 <a:latin typeface="Courier" pitchFamily="49" charset="0"/>
               </a:rPr>
-              <a:t>   @</a:t>
-            </a:r>
+              <a:t>   @GET</a:t>
+            </a:r>
+          </a:p>
+          <a:p>
+            <a:pPr>
+              <a:buNone/>
+            </a:pPr>
             <a:r>
               <a:rPr lang="en-US" sz="1400" b="1" dirty="0" smtClean="0">
                 <a:solidFill>
@@ -12298,19 +12107,17 @@
                 </a:solidFill>
                 <a:latin typeface="Courier" pitchFamily="49" charset="0"/>
               </a:rPr>
-              <a:t>GET</a:t>
-            </a:r>
-            <a:endParaRPr lang="en-US" sz="1400" b="1" dirty="0" smtClean="0">
-              <a:solidFill>
-                <a:schemeClr val="accent2"/>
-              </a:solidFill>
-              <a:latin typeface="Courier" pitchFamily="49" charset="0"/>
-            </a:endParaRPr>
-          </a:p>
-          <a:p>
-            <a:pPr>
-              <a:buNone/>
-            </a:pPr>
+              <a:t>	public </a:t>
+            </a:r>
+            <a:r>
+              <a:rPr lang="en-US" sz="1400" b="1" dirty="0" err="1" smtClean="0">
+                <a:solidFill>
+                  <a:schemeClr val="accent2"/>
+                </a:solidFill>
+                <a:latin typeface="Courier" pitchFamily="49" charset="0"/>
+              </a:rPr>
+              <a:t>CollectionObjectList</a:t>
+            </a:r>
             <a:r>
               <a:rPr lang="en-US" sz="1400" b="1" dirty="0" smtClean="0">
                 <a:solidFill>
@@ -12318,7 +12125,7 @@
                 </a:solidFill>
                 <a:latin typeface="Courier" pitchFamily="49" charset="0"/>
               </a:rPr>
-              <a:t>	public </a:t>
+              <a:t> </a:t>
             </a:r>
             <a:r>
               <a:rPr lang="en-US" sz="1400" b="1" dirty="0" err="1" smtClean="0">
@@ -12327,7 +12134,7 @@
                 </a:solidFill>
                 <a:latin typeface="Courier" pitchFamily="49" charset="0"/>
               </a:rPr>
-              <a:t>CollectionObjectList</a:t>
+              <a:t>getCollectionObjectList</a:t>
             </a:r>
             <a:r>
               <a:rPr lang="en-US" sz="1400" b="1" dirty="0" smtClean="0">
@@ -12336,6 +12143,33 @@
                 </a:solidFill>
                 <a:latin typeface="Courier" pitchFamily="49" charset="0"/>
               </a:rPr>
+              <a:t>(</a:t>
+            </a:r>
+            <a:r>
+              <a:rPr lang="en-US" sz="1400" b="1" dirty="0" smtClean="0">
+                <a:solidFill>
+                  <a:srgbClr val="FF0000"/>
+                </a:solidFill>
+                <a:latin typeface="Courier" pitchFamily="49" charset="0"/>
+              </a:rPr>
+              <a:t>@Context </a:t>
+            </a:r>
+            <a:r>
+              <a:rPr lang="en-US" sz="1400" b="1" dirty="0" err="1" smtClean="0">
+                <a:solidFill>
+                  <a:srgbClr val="FF0000"/>
+                </a:solidFill>
+                <a:latin typeface="Courier" pitchFamily="49" charset="0"/>
+              </a:rPr>
+              <a:t>UriInfo</a:t>
+            </a:r>
+            <a:r>
+              <a:rPr lang="en-US" sz="1400" b="1" dirty="0" smtClean="0">
+                <a:solidFill>
+                  <a:srgbClr val="FF0000"/>
+                </a:solidFill>
+                <a:latin typeface="Courier" pitchFamily="49" charset="0"/>
+              </a:rPr>
               <a:t> </a:t>
             </a:r>
             <a:r>
@@ -12345,7 +12179,7 @@
                 </a:solidFill>
                 <a:latin typeface="Courier" pitchFamily="49" charset="0"/>
               </a:rPr>
-              <a:t>getCollectionObjectList</a:t>
+              <a:t>ui</a:t>
             </a:r>
             <a:r>
               <a:rPr lang="en-US" sz="1400" b="1" dirty="0" smtClean="0">
@@ -12354,61 +12188,7 @@
                 </a:solidFill>
                 <a:latin typeface="Courier" pitchFamily="49" charset="0"/>
               </a:rPr>
-              <a:t>(</a:t>
-            </a:r>
-            <a:r>
-              <a:rPr lang="en-US" sz="1400" b="1" dirty="0" smtClean="0">
-                <a:solidFill>
-                  <a:srgbClr val="FF0000"/>
-                </a:solidFill>
-                <a:latin typeface="Courier" pitchFamily="49" charset="0"/>
-              </a:rPr>
-              <a:t>@Context </a:t>
-            </a:r>
-            <a:r>
-              <a:rPr lang="en-US" sz="1400" b="1" dirty="0" err="1" smtClean="0">
-                <a:solidFill>
-                  <a:srgbClr val="FF0000"/>
-                </a:solidFill>
-                <a:latin typeface="Courier" pitchFamily="49" charset="0"/>
-              </a:rPr>
-              <a:t>UriInfo</a:t>
-            </a:r>
-            <a:r>
-              <a:rPr lang="en-US" sz="1400" b="1" dirty="0" smtClean="0">
-                <a:solidFill>
-                  <a:srgbClr val="FF0000"/>
-                </a:solidFill>
-                <a:latin typeface="Courier" pitchFamily="49" charset="0"/>
-              </a:rPr>
-              <a:t> </a:t>
-            </a:r>
-            <a:r>
-              <a:rPr lang="en-US" sz="1400" b="1" dirty="0" err="1" smtClean="0">
-                <a:solidFill>
-                  <a:schemeClr val="accent2"/>
-                </a:solidFill>
-                <a:latin typeface="Courier" pitchFamily="49" charset="0"/>
-              </a:rPr>
-              <a:t>ui</a:t>
-            </a:r>
-            <a:r>
-              <a:rPr lang="en-US" sz="1400" b="1" dirty="0" smtClean="0">
-                <a:solidFill>
-                  <a:schemeClr val="accent2"/>
-                </a:solidFill>
-                <a:latin typeface="Courier" pitchFamily="49" charset="0"/>
-              </a:rPr>
-              <a:t>) </a:t>
-            </a:r>
-            <a:r>
-              <a:rPr lang="en-US" sz="1400" b="1" dirty="0" smtClean="0">
-                <a:solidFill>
-                  <a:schemeClr val="accent2"/>
-                </a:solidFill>
-                <a:latin typeface="Courier" pitchFamily="49" charset="0"/>
-              </a:rPr>
-              <a:t>{ … }</a:t>
+              <a:t>) { … }</a:t>
             </a:r>
           </a:p>
           <a:p>

</xml_diff>